<commit_message>
Update to 3 sprinto skaidrės
</commit_message>
<xml_diff>
--- a/Skaidres/WcDonaldas_3Sprintas.pptx
+++ b/Skaidres/WcDonaldas_3Sprintas.pptx
@@ -6604,58 +6604,6 @@
           </a:p>
         </p:txBody>
       </p:sp>
-      <p:sp>
-        <p:nvSpPr>
-          <p:cNvPr id="79" name="Google Shape;79;p14">
-            <a:extLst>
-              <a:ext uri="{FF2B5EF4-FFF2-40B4-BE49-F238E27FC236}">
-                <a16:creationId xmlns:a16="http://schemas.microsoft.com/office/drawing/2014/main" id="{890DA114-EDBC-7C05-87AF-E1D30C0F64F2}"/>
-              </a:ext>
-            </a:extLst>
-          </p:cNvPr>
-          <p:cNvSpPr txBox="1">
-            <a:spLocks noGrp="1"/>
-          </p:cNvSpPr>
-          <p:nvPr>
-            <p:ph type="title" idx="4294967295"/>
-          </p:nvPr>
-        </p:nvSpPr>
-        <p:spPr>
-          <a:xfrm>
-            <a:off x="535775" y="1480150"/>
-            <a:ext cx="5197200" cy="3067500"/>
-          </a:xfrm>
-          <a:prstGeom prst="rect">
-            <a:avLst/>
-          </a:prstGeom>
-        </p:spPr>
-        <p:txBody>
-          <a:bodyPr spcFirstLastPara="1" wrap="square" lIns="91425" tIns="91425" rIns="91425" bIns="91425" anchor="t" anchorCtr="0">
-            <a:noAutofit/>
-          </a:bodyPr>
-          <a:lstStyle/>
-          <a:p>
-            <a:pPr marL="0" lvl="0" indent="0" algn="l" rtl="0">
-              <a:lnSpc>
-                <a:spcPct val="115000"/>
-              </a:lnSpc>
-              <a:spcBef>
-                <a:spcPts val="0"/>
-              </a:spcBef>
-              <a:spcAft>
-                <a:spcPts val="1600"/>
-              </a:spcAft>
-              <a:buNone/>
-            </a:pPr>
-            <a:endParaRPr sz="1700" dirty="0">
-              <a:latin typeface="Lato"/>
-              <a:ea typeface="Lato"/>
-              <a:cs typeface="Lato"/>
-              <a:sym typeface="Lato"/>
-            </a:endParaRPr>
-          </a:p>
-        </p:txBody>
-      </p:sp>
       <p:pic>
         <p:nvPicPr>
           <p:cNvPr id="3" name="Picture 2">
@@ -7058,7 +7006,7 @@
         <p:spPr>
           <a:xfrm>
             <a:off x="746840" y="1852737"/>
-            <a:ext cx="5433738" cy="738664"/>
+            <a:ext cx="5433738" cy="954107"/>
           </a:xfrm>
           <a:prstGeom prst="rect">
             <a:avLst/>
@@ -7070,6 +7018,25 @@
             <a:spAutoFit/>
           </a:bodyPr>
           <a:lstStyle/>
+          <a:p>
+            <a:pPr marL="285750" indent="-285750">
+              <a:buFont typeface="Arial" panose="020B0604020202020204" pitchFamily="34" charset="0"/>
+              <a:buChar char="•"/>
+            </a:pPr>
+            <a:r>
+              <a:rPr lang="en-US" dirty="0" err="1"/>
+              <a:t>Duoti</a:t>
+            </a:r>
+            <a:r>
+              <a:rPr lang="en-US" dirty="0"/>
+              <a:t> </a:t>
+            </a:r>
+            <a:r>
+              <a:rPr lang="lt-LT" dirty="0"/>
+              <a:t>žaidėjui rankas</a:t>
+            </a:r>
+            <a:endParaRPr lang="en-US" dirty="0"/>
+          </a:p>
           <a:p>
             <a:pPr marL="285750" indent="-285750">
               <a:buFont typeface="Arial" panose="020B0604020202020204" pitchFamily="34" charset="0"/>

</xml_diff>

<commit_message>
Updated slides and added built game
</commit_message>
<xml_diff>
--- a/Skaidres/WcDonaldas_3Sprintas.pptx
+++ b/Skaidres/WcDonaldas_3Sprintas.pptx
@@ -5,7 +5,7 @@
     <p:sldMasterId id="2147483659" r:id="rId1"/>
   </p:sldMasterIdLst>
   <p:notesMasterIdLst>
-    <p:notesMasterId r:id="rId9"/>
+    <p:notesMasterId r:id="rId10"/>
   </p:notesMasterIdLst>
   <p:sldIdLst>
     <p:sldId id="256" r:id="rId2"/>
@@ -14,24 +14,25 @@
     <p:sldId id="258" r:id="rId5"/>
     <p:sldId id="259" r:id="rId6"/>
     <p:sldId id="260" r:id="rId7"/>
-    <p:sldId id="265" r:id="rId8"/>
+    <p:sldId id="267" r:id="rId8"/>
+    <p:sldId id="265" r:id="rId9"/>
   </p:sldIdLst>
   <p:sldSz cx="9144000" cy="5143500" type="screen16x9"/>
   <p:notesSz cx="6858000" cy="9144000"/>
   <p:embeddedFontLst>
     <p:embeddedFont>
       <p:font typeface="Lato" panose="020F0502020204030203" pitchFamily="34" charset="0"/>
-      <p:regular r:id="rId10"/>
-      <p:bold r:id="rId11"/>
-      <p:italic r:id="rId12"/>
-      <p:boldItalic r:id="rId13"/>
+      <p:regular r:id="rId11"/>
+      <p:bold r:id="rId12"/>
+      <p:italic r:id="rId13"/>
+      <p:boldItalic r:id="rId14"/>
     </p:embeddedFont>
     <p:embeddedFont>
       <p:font typeface="Raleway" pitchFamily="2" charset="0"/>
-      <p:regular r:id="rId14"/>
-      <p:bold r:id="rId15"/>
-      <p:italic r:id="rId16"/>
-      <p:boldItalic r:id="rId17"/>
+      <p:regular r:id="rId15"/>
+      <p:bold r:id="rId16"/>
+      <p:italic r:id="rId17"/>
+      <p:boldItalic r:id="rId18"/>
     </p:embeddedFont>
   </p:embeddedFontLst>
   <p:defaultTextStyle>
@@ -1620,6 +1621,133 @@
 </file>
 
 <file path=ppt/notesSlides/notesSlide7.xml><?xml version="1.0" encoding="utf-8"?>
+<p:notes xmlns:a="http://schemas.openxmlformats.org/drawingml/2006/main" xmlns:r="http://schemas.openxmlformats.org/officeDocument/2006/relationships" xmlns:p="http://schemas.openxmlformats.org/presentationml/2006/main" showMasterSp="0" showMasterPhAnim="0">
+  <p:cSld>
+    <p:spTree>
+      <p:nvGrpSpPr>
+        <p:cNvPr id="1" name="Shape 93">
+          <a:extLst>
+            <a:ext uri="{FF2B5EF4-FFF2-40B4-BE49-F238E27FC236}">
+              <a16:creationId xmlns:a16="http://schemas.microsoft.com/office/drawing/2014/main" id="{1780E057-9D94-B8F5-C103-13D32CF1154A}"/>
+            </a:ext>
+          </a:extLst>
+        </p:cNvPr>
+        <p:cNvGrpSpPr/>
+        <p:nvPr/>
+      </p:nvGrpSpPr>
+      <p:grpSpPr>
+        <a:xfrm>
+          <a:off x="0" y="0"/>
+          <a:ext cx="0" cy="0"/>
+          <a:chOff x="0" y="0"/>
+          <a:chExt cx="0" cy="0"/>
+        </a:xfrm>
+      </p:grpSpPr>
+      <p:sp>
+        <p:nvSpPr>
+          <p:cNvPr id="94" name="Google Shape;94;g300c7c21a7b_1_14:notes">
+            <a:extLst>
+              <a:ext uri="{FF2B5EF4-FFF2-40B4-BE49-F238E27FC236}">
+                <a16:creationId xmlns:a16="http://schemas.microsoft.com/office/drawing/2014/main" id="{873A47C0-6405-CCF6-64EF-63AD30CC566A}"/>
+              </a:ext>
+            </a:extLst>
+          </p:cNvPr>
+          <p:cNvSpPr>
+            <a:spLocks noGrp="1" noRot="1" noChangeAspect="1"/>
+          </p:cNvSpPr>
+          <p:nvPr>
+            <p:ph type="sldImg" idx="2"/>
+          </p:nvPr>
+        </p:nvSpPr>
+        <p:spPr>
+          <a:xfrm>
+            <a:off x="381000" y="685800"/>
+            <a:ext cx="6096000" cy="3429000"/>
+          </a:xfrm>
+          <a:custGeom>
+            <a:avLst/>
+            <a:gdLst/>
+            <a:ahLst/>
+            <a:cxnLst/>
+            <a:rect l="l" t="t" r="r" b="b"/>
+            <a:pathLst>
+              <a:path w="120000" h="120000" extrusionOk="0">
+                <a:moveTo>
+                  <a:pt x="0" y="0"/>
+                </a:moveTo>
+                <a:lnTo>
+                  <a:pt x="120000" y="0"/>
+                </a:lnTo>
+                <a:lnTo>
+                  <a:pt x="120000" y="120000"/>
+                </a:lnTo>
+                <a:lnTo>
+                  <a:pt x="0" y="120000"/>
+                </a:lnTo>
+                <a:close/>
+              </a:path>
+            </a:pathLst>
+          </a:custGeom>
+        </p:spPr>
+      </p:sp>
+      <p:sp>
+        <p:nvSpPr>
+          <p:cNvPr id="95" name="Google Shape;95;g300c7c21a7b_1_14:notes">
+            <a:extLst>
+              <a:ext uri="{FF2B5EF4-FFF2-40B4-BE49-F238E27FC236}">
+                <a16:creationId xmlns:a16="http://schemas.microsoft.com/office/drawing/2014/main" id="{DD0C6501-E8AB-BD85-9DC0-313992FC0115}"/>
+              </a:ext>
+            </a:extLst>
+          </p:cNvPr>
+          <p:cNvSpPr txBox="1">
+            <a:spLocks noGrp="1"/>
+          </p:cNvSpPr>
+          <p:nvPr>
+            <p:ph type="body" idx="1"/>
+          </p:nvPr>
+        </p:nvSpPr>
+        <p:spPr>
+          <a:xfrm>
+            <a:off x="685800" y="4343400"/>
+            <a:ext cx="5486400" cy="4114800"/>
+          </a:xfrm>
+          <a:prstGeom prst="rect">
+            <a:avLst/>
+          </a:prstGeom>
+        </p:spPr>
+        <p:txBody>
+          <a:bodyPr spcFirstLastPara="1" wrap="square" lIns="91425" tIns="91425" rIns="91425" bIns="91425" anchor="t" anchorCtr="0">
+            <a:noAutofit/>
+          </a:bodyPr>
+          <a:lstStyle/>
+          <a:p>
+            <a:pPr marL="0" lvl="0" indent="0" algn="l" rtl="0">
+              <a:spcBef>
+                <a:spcPts val="0"/>
+              </a:spcBef>
+              <a:spcAft>
+                <a:spcPts val="0"/>
+              </a:spcAft>
+              <a:buNone/>
+            </a:pPr>
+            <a:endParaRPr/>
+          </a:p>
+        </p:txBody>
+      </p:sp>
+    </p:spTree>
+    <p:extLst>
+      <p:ext uri="{BB962C8B-B14F-4D97-AF65-F5344CB8AC3E}">
+        <p14:creationId xmlns:p14="http://schemas.microsoft.com/office/powerpoint/2010/main" val="4004183749"/>
+      </p:ext>
+    </p:extLst>
+  </p:cSld>
+  <p:clrMapOvr>
+    <a:masterClrMapping/>
+  </p:clrMapOvr>
+</p:notes>
+</file>
+
+<file path=ppt/notesSlides/notesSlide8.xml><?xml version="1.0" encoding="utf-8"?>
 <p:notes xmlns:a="http://schemas.openxmlformats.org/drawingml/2006/main" xmlns:r="http://schemas.openxmlformats.org/officeDocument/2006/relationships" xmlns:p="http://schemas.openxmlformats.org/presentationml/2006/main" showMasterSp="0" showMasterPhAnim="0">
   <p:cSld>
     <p:spTree>
@@ -7270,6 +7398,133 @@
 <file path=ppt/slides/slide7.xml><?xml version="1.0" encoding="utf-8"?>
 <p:sld xmlns:a="http://schemas.openxmlformats.org/drawingml/2006/main" xmlns:r="http://schemas.openxmlformats.org/officeDocument/2006/relationships" xmlns:p="http://schemas.openxmlformats.org/presentationml/2006/main">
   <p:cSld>
+    <p:spTree>
+      <p:nvGrpSpPr>
+        <p:cNvPr id="1" name="Shape 96">
+          <a:extLst>
+            <a:ext uri="{FF2B5EF4-FFF2-40B4-BE49-F238E27FC236}">
+              <a16:creationId xmlns:a16="http://schemas.microsoft.com/office/drawing/2014/main" id="{00DC9702-D498-ED87-C7CB-5F54A2A0BF07}"/>
+            </a:ext>
+          </a:extLst>
+        </p:cNvPr>
+        <p:cNvGrpSpPr/>
+        <p:nvPr/>
+      </p:nvGrpSpPr>
+      <p:grpSpPr>
+        <a:xfrm>
+          <a:off x="0" y="0"/>
+          <a:ext cx="0" cy="0"/>
+          <a:chOff x="0" y="0"/>
+          <a:chExt cx="0" cy="0"/>
+        </a:xfrm>
+      </p:grpSpPr>
+      <p:sp>
+        <p:nvSpPr>
+          <p:cNvPr id="97" name="Google Shape;97;p17">
+            <a:extLst>
+              <a:ext uri="{FF2B5EF4-FFF2-40B4-BE49-F238E27FC236}">
+                <a16:creationId xmlns:a16="http://schemas.microsoft.com/office/drawing/2014/main" id="{294CDB12-12BF-CC59-797D-D7CF376187E8}"/>
+              </a:ext>
+            </a:extLst>
+          </p:cNvPr>
+          <p:cNvSpPr txBox="1">
+            <a:spLocks noGrp="1"/>
+          </p:cNvSpPr>
+          <p:nvPr>
+            <p:ph type="title" idx="4294967295"/>
+          </p:nvPr>
+        </p:nvSpPr>
+        <p:spPr>
+          <a:xfrm>
+            <a:off x="452648" y="314987"/>
+            <a:ext cx="5197200" cy="768000"/>
+          </a:xfrm>
+          <a:prstGeom prst="rect">
+            <a:avLst/>
+          </a:prstGeom>
+        </p:spPr>
+        <p:txBody>
+          <a:bodyPr spcFirstLastPara="1" wrap="square" lIns="91425" tIns="91425" rIns="91425" bIns="91425" anchor="t" anchorCtr="0">
+            <a:noAutofit/>
+          </a:bodyPr>
+          <a:lstStyle/>
+          <a:p>
+            <a:pPr marL="0" lvl="0" indent="0" algn="l" rtl="0">
+              <a:spcBef>
+                <a:spcPts val="0"/>
+              </a:spcBef>
+              <a:spcAft>
+                <a:spcPts val="1600"/>
+              </a:spcAft>
+              <a:buNone/>
+            </a:pPr>
+            <a:r>
+              <a:rPr lang="lt-LT" sz="3600" dirty="0">
+                <a:solidFill>
+                  <a:schemeClr val="dk1"/>
+                </a:solidFill>
+              </a:rPr>
+              <a:t>Gito repo </a:t>
+            </a:r>
+            <a:endParaRPr sz="2400" dirty="0"/>
+          </a:p>
+        </p:txBody>
+      </p:sp>
+      <p:sp>
+        <p:nvSpPr>
+          <p:cNvPr id="2" name="TextBox 1">
+            <a:extLst>
+              <a:ext uri="{FF2B5EF4-FFF2-40B4-BE49-F238E27FC236}">
+                <a16:creationId xmlns:a16="http://schemas.microsoft.com/office/drawing/2014/main" id="{DC12AEDB-F2B9-EBC9-B469-49E56A3E5C10}"/>
+              </a:ext>
+            </a:extLst>
+          </p:cNvPr>
+          <p:cNvSpPr txBox="1"/>
+          <p:nvPr/>
+        </p:nvSpPr>
+        <p:spPr>
+          <a:xfrm>
+            <a:off x="569705" y="1503254"/>
+            <a:ext cx="5080143" cy="307777"/>
+          </a:xfrm>
+          <a:prstGeom prst="rect">
+            <a:avLst/>
+          </a:prstGeom>
+          <a:noFill/>
+        </p:spPr>
+        <p:txBody>
+          <a:bodyPr wrap="square" rtlCol="0">
+            <a:spAutoFit/>
+          </a:bodyPr>
+          <a:lstStyle/>
+          <a:p>
+            <a:pPr marL="285750" indent="-285750">
+              <a:buFont typeface="Arial" panose="020B0604020202020204" pitchFamily="34" charset="0"/>
+              <a:buChar char="•"/>
+            </a:pPr>
+            <a:r>
+              <a:rPr lang="en-US" dirty="0"/>
+              <a:t>https://github.com/MartynasKul/WcDSim</a:t>
+            </a:r>
+          </a:p>
+        </p:txBody>
+      </p:sp>
+    </p:spTree>
+    <p:extLst>
+      <p:ext uri="{BB962C8B-B14F-4D97-AF65-F5344CB8AC3E}">
+        <p14:creationId xmlns:p14="http://schemas.microsoft.com/office/powerpoint/2010/main" val="1530249250"/>
+      </p:ext>
+    </p:extLst>
+  </p:cSld>
+  <p:clrMapOvr>
+    <a:masterClrMapping/>
+  </p:clrMapOvr>
+</p:sld>
+</file>
+
+<file path=ppt/slides/slide8.xml><?xml version="1.0" encoding="utf-8"?>
+<p:sld xmlns:a="http://schemas.openxmlformats.org/drawingml/2006/main" xmlns:r="http://schemas.openxmlformats.org/officeDocument/2006/relationships" xmlns:p="http://schemas.openxmlformats.org/presentationml/2006/main">
+  <p:cSld>
     <p:bg>
       <p:bgPr>
         <a:solidFill>

</xml_diff>

<commit_message>
Updates/adds: NPC SOUND BURGY MAKING  NPC MOVE AND STEAL BURGY
literally the title
</commit_message>
<xml_diff>
--- a/Skaidres/WcDonaldas_3Sprintas.pptx
+++ b/Skaidres/WcDonaldas_3Sprintas.pptx
@@ -7485,7 +7485,7 @@
         <p:spPr>
           <a:xfrm>
             <a:off x="569705" y="1503254"/>
-            <a:ext cx="5080143" cy="307777"/>
+            <a:ext cx="5080143" cy="1169551"/>
           </a:xfrm>
           <a:prstGeom prst="rect">
             <a:avLst/>
@@ -7503,9 +7503,52 @@
               <a:buChar char="•"/>
             </a:pPr>
             <a:r>
-              <a:rPr lang="en-US" dirty="0"/>
+              <a:rPr lang="en-US" dirty="0">
+                <a:hlinkClick r:id="rId3"/>
+              </a:rPr>
               <a:t>https://github.com/MartynasKul/WcDSim</a:t>
             </a:r>
+            <a:endParaRPr lang="en-US" dirty="0"/>
+          </a:p>
+          <a:p>
+            <a:pPr marL="285750" indent="-285750">
+              <a:buFont typeface="Arial" panose="020B0604020202020204" pitchFamily="34" charset="0"/>
+              <a:buChar char="•"/>
+            </a:pPr>
+            <a:endParaRPr lang="en-US" dirty="0"/>
+          </a:p>
+          <a:p>
+            <a:pPr marL="285750" indent="-285750">
+              <a:buFont typeface="Arial" panose="020B0604020202020204" pitchFamily="34" charset="0"/>
+              <a:buChar char="•"/>
+            </a:pPr>
+            <a:r>
+              <a:rPr lang="en-US" dirty="0" err="1"/>
+              <a:t>Subuildintas</a:t>
+            </a:r>
+            <a:r>
+              <a:rPr lang="en-US" dirty="0"/>
+              <a:t> </a:t>
+            </a:r>
+            <a:r>
+              <a:rPr lang="en-US" dirty="0" err="1"/>
+              <a:t>projektas</a:t>
+            </a:r>
+            <a:r>
+              <a:rPr lang="en-US" dirty="0"/>
+              <a:t>:</a:t>
+            </a:r>
+          </a:p>
+          <a:p>
+            <a:pPr marL="285750" indent="-285750">
+              <a:buFont typeface="Arial" panose="020B0604020202020204" pitchFamily="34" charset="0"/>
+              <a:buChar char="•"/>
+            </a:pPr>
+            <a:r>
+              <a:rPr lang="en-US"/>
+              <a:t>https://drive.google.com/drive/folders/11h6vm97gGb5ItiLMrskLFJmY8HVqxrKb?usp=sharing</a:t>
+            </a:r>
+            <a:endParaRPr lang="en-US" dirty="0"/>
           </a:p>
         </p:txBody>
       </p:sp>

</xml_diff>